<commit_message>
Inserção de rotina para ler arquivo pdf e exibir primeira página em tela
</commit_message>
<xml_diff>
--- a/log.pptx
+++ b/log.pptx
@@ -3458,7 +3458,7 @@
         <p:spPr>
           <a:xfrm>
             <a:off x="3739201" y="30340"/>
-            <a:ext cx="4713598" cy="369332"/>
+            <a:ext cx="4721614" cy="369332"/>
           </a:xfrm>
           <a:prstGeom prst="rect">
             <a:avLst/>
@@ -3473,7 +3473,7 @@
           <a:p>
             <a:r>
               <a:rPr lang="pt-BR" dirty="0"/>
-              <a:t>Extração de dados em CSV do período desejado:</a:t>
+              <a:t>Extração de dados em PDF do período desejado:</a:t>
             </a:r>
           </a:p>
         </p:txBody>
@@ -3983,7 +3983,7 @@
         <p:spPr>
           <a:xfrm>
             <a:off x="2784067" y="76421"/>
-            <a:ext cx="6623865" cy="369332"/>
+            <a:ext cx="6705875" cy="369332"/>
           </a:xfrm>
           <a:prstGeom prst="rect">
             <a:avLst/>
@@ -4006,15 +4006,7 @@
             </a:r>
             <a:r>
               <a:rPr lang="pt-BR" dirty="0"/>
-              <a:t>. Estoque – Informações Complementares” em </a:t>
-            </a:r>
-            <a:r>
-              <a:rPr lang="pt-BR" dirty="0" err="1"/>
-              <a:t>csv</a:t>
-            </a:r>
-            <a:r>
-              <a:rPr lang="pt-BR" dirty="0"/>
-              <a:t>:</a:t>
+              <a:t>. Estoque – Informações Complementares” em PDF:</a:t>
             </a:r>
           </a:p>
         </p:txBody>
@@ -4559,7 +4551,7 @@
         <p:spPr>
           <a:xfrm>
             <a:off x="4844856" y="75996"/>
-            <a:ext cx="2502288" cy="369332"/>
+            <a:ext cx="2581091" cy="369332"/>
           </a:xfrm>
           <a:prstGeom prst="rect">
             <a:avLst/>
@@ -4574,160 +4566,7 @@
           <a:p>
             <a:r>
               <a:rPr lang="pt-BR" dirty="0"/>
-              <a:t>Exportar arquivo em </a:t>
-            </a:r>
-            <a:r>
-              <a:rPr lang="pt-BR" dirty="0" err="1"/>
-              <a:t>csv</a:t>
-            </a:r>
-            <a:r>
-              <a:rPr lang="pt-BR" dirty="0"/>
-              <a:t>:</a:t>
-            </a:r>
-          </a:p>
-        </p:txBody>
-      </p:sp>
-      <p:sp>
-        <p:nvSpPr>
-          <p:cNvPr id="11" name="Retângulo 10">
-            <a:extLst>
-              <a:ext uri="{FF2B5EF4-FFF2-40B4-BE49-F238E27FC236}">
-                <a16:creationId xmlns:a16="http://schemas.microsoft.com/office/drawing/2014/main" id="{5C7D2F4E-4E8C-5186-CA17-29F7E70E2748}"/>
-              </a:ext>
-            </a:extLst>
-          </p:cNvPr>
-          <p:cNvSpPr/>
-          <p:nvPr/>
-        </p:nvSpPr>
-        <p:spPr>
-          <a:xfrm>
-            <a:off x="5955030" y="1405890"/>
-            <a:ext cx="1141549" cy="250950"/>
-          </a:xfrm>
-          <a:prstGeom prst="rect">
-            <a:avLst/>
-          </a:prstGeom>
-          <a:noFill/>
-          <a:ln w="38100">
-            <a:solidFill>
-              <a:schemeClr val="accent6">
-                <a:lumMod val="50000"/>
-              </a:schemeClr>
-            </a:solidFill>
-          </a:ln>
-        </p:spPr>
-        <p:style>
-          <a:lnRef idx="2">
-            <a:schemeClr val="accent1">
-              <a:shade val="15000"/>
-            </a:schemeClr>
-          </a:lnRef>
-          <a:fillRef idx="1">
-            <a:schemeClr val="accent1"/>
-          </a:fillRef>
-          <a:effectRef idx="0">
-            <a:schemeClr val="accent1"/>
-          </a:effectRef>
-          <a:fontRef idx="minor">
-            <a:schemeClr val="lt1"/>
-          </a:fontRef>
-        </p:style>
-        <p:txBody>
-          <a:bodyPr rtlCol="0" anchor="ctr"/>
-          <a:lstStyle/>
-          <a:p>
-            <a:pPr algn="ctr"/>
-            <a:endParaRPr lang="pt-BR"/>
-          </a:p>
-        </p:txBody>
-      </p:sp>
-      <p:cxnSp>
-        <p:nvCxnSpPr>
-          <p:cNvPr id="14" name="Conector de Seta Reta 13">
-            <a:extLst>
-              <a:ext uri="{FF2B5EF4-FFF2-40B4-BE49-F238E27FC236}">
-                <a16:creationId xmlns:a16="http://schemas.microsoft.com/office/drawing/2014/main" id="{A1E58DB3-1899-6B9E-3B6D-BA5D9DB1B4C4}"/>
-              </a:ext>
-            </a:extLst>
-          </p:cNvPr>
-          <p:cNvCxnSpPr>
-            <a:cxnSpLocks/>
-            <a:stCxn id="13" idx="1"/>
-          </p:cNvCxnSpPr>
-          <p:nvPr/>
-        </p:nvCxnSpPr>
-        <p:spPr>
-          <a:xfrm flipH="1">
-            <a:off x="7096579" y="827881"/>
-            <a:ext cx="3634038" cy="703484"/>
-          </a:xfrm>
-          <a:prstGeom prst="straightConnector1">
-            <a:avLst/>
-          </a:prstGeom>
-          <a:ln>
-            <a:solidFill>
-              <a:schemeClr val="accent6">
-                <a:lumMod val="50000"/>
-              </a:schemeClr>
-            </a:solidFill>
-            <a:tailEnd type="triangle"/>
-          </a:ln>
-        </p:spPr>
-        <p:style>
-          <a:lnRef idx="1">
-            <a:schemeClr val="accent1"/>
-          </a:lnRef>
-          <a:fillRef idx="0">
-            <a:schemeClr val="accent1"/>
-          </a:fillRef>
-          <a:effectRef idx="0">
-            <a:schemeClr val="accent1"/>
-          </a:effectRef>
-          <a:fontRef idx="minor">
-            <a:schemeClr val="tx1"/>
-          </a:fontRef>
-        </p:style>
-      </p:cxnSp>
-      <p:sp>
-        <p:nvSpPr>
-          <p:cNvPr id="13" name="CaixaDeTexto 12">
-            <a:extLst>
-              <a:ext uri="{FF2B5EF4-FFF2-40B4-BE49-F238E27FC236}">
-                <a16:creationId xmlns:a16="http://schemas.microsoft.com/office/drawing/2014/main" id="{B6293388-73E5-0005-F02B-57445E52ADCA}"/>
-              </a:ext>
-            </a:extLst>
-          </p:cNvPr>
-          <p:cNvSpPr txBox="1"/>
-          <p:nvPr/>
-        </p:nvSpPr>
-        <p:spPr>
-          <a:xfrm>
-            <a:off x="10730617" y="643215"/>
-            <a:ext cx="734737" cy="369332"/>
-          </a:xfrm>
-          <a:prstGeom prst="rect">
-            <a:avLst/>
-          </a:prstGeom>
-          <a:solidFill>
-            <a:schemeClr val="bg1"/>
-          </a:solidFill>
-          <a:ln w="38100">
-            <a:solidFill>
-              <a:schemeClr val="accent6">
-                <a:lumMod val="50000"/>
-              </a:schemeClr>
-            </a:solidFill>
-          </a:ln>
-        </p:spPr>
-        <p:txBody>
-          <a:bodyPr wrap="square" rtlCol="0">
-            <a:spAutoFit/>
-          </a:bodyPr>
-          <a:lstStyle/>
-          <a:p>
-            <a:r>
-              <a:rPr lang="pt-BR" dirty="0"/>
-              <a:t>CLICK</a:t>
+              <a:t>Exportar arquivo em PDF:</a:t>
             </a:r>
           </a:p>
         </p:txBody>
@@ -4927,10 +4766,10 @@
       </p:pic>
       <p:pic>
         <p:nvPicPr>
-          <p:cNvPr id="3" name="Imagem 2" descr="Logotipo, nome da empresa&#10;&#10;Descrição gerada automaticamente">
-            <a:extLst>
-              <a:ext uri="{FF2B5EF4-FFF2-40B4-BE49-F238E27FC236}">
-                <a16:creationId xmlns:a16="http://schemas.microsoft.com/office/drawing/2014/main" id="{9219A091-E0B1-F2E6-6576-3774CF1F89C6}"/>
+          <p:cNvPr id="7" name="Imagem 6">
+            <a:extLst>
+              <a:ext uri="{FF2B5EF4-FFF2-40B4-BE49-F238E27FC236}">
+                <a16:creationId xmlns:a16="http://schemas.microsoft.com/office/drawing/2014/main" id="{53A529C6-E2F1-0B83-F2D5-F315D034A26C}"/>
               </a:ext>
             </a:extLst>
           </p:cNvPr>
@@ -4940,111 +4779,27 @@
           <p:nvPr/>
         </p:nvPicPr>
         <p:blipFill>
-          <a:blip r:embed="rId3" cstate="print">
-            <a:extLst>
-              <a:ext uri="{28A0092B-C50C-407E-A947-70E740481C1C}">
-                <a14:useLocalDpi xmlns:a14="http://schemas.microsoft.com/office/drawing/2010/main" val="0"/>
-              </a:ext>
-            </a:extLst>
-          </a:blip>
+          <a:blip r:embed="rId3"/>
           <a:stretch>
             <a:fillRect/>
           </a:stretch>
         </p:blipFill>
         <p:spPr>
           <a:xfrm>
-            <a:off x="10232571" y="6056502"/>
-            <a:ext cx="1730829" cy="803653"/>
+            <a:off x="2804932" y="873896"/>
+            <a:ext cx="7199040" cy="5589156"/>
           </a:xfrm>
           <a:prstGeom prst="rect">
             <a:avLst/>
           </a:prstGeom>
         </p:spPr>
       </p:pic>
-      <p:sp>
-        <p:nvSpPr>
-          <p:cNvPr id="2" name="Subtítulo 2">
-            <a:extLst>
-              <a:ext uri="{FF2B5EF4-FFF2-40B4-BE49-F238E27FC236}">
-                <a16:creationId xmlns:a16="http://schemas.microsoft.com/office/drawing/2014/main" id="{EC625675-72F7-A912-8106-0A7A83555282}"/>
-              </a:ext>
-            </a:extLst>
-          </p:cNvPr>
-          <p:cNvSpPr>
-            <a:spLocks noGrp="1"/>
-          </p:cNvSpPr>
-          <p:nvPr>
-            <p:ph type="subTitle" idx="1"/>
-          </p:nvPr>
-        </p:nvSpPr>
-        <p:spPr>
-          <a:xfrm>
-            <a:off x="0" y="0"/>
-            <a:ext cx="2804932" cy="1655762"/>
-          </a:xfrm>
-        </p:spPr>
-        <p:txBody>
-          <a:bodyPr>
-            <a:normAutofit/>
-          </a:bodyPr>
-          <a:lstStyle/>
-          <a:p>
-            <a:r>
-              <a:rPr lang="pt-BR" sz="4000" dirty="0"/>
-              <a:t>IW</a:t>
-            </a:r>
-          </a:p>
-        </p:txBody>
-      </p:sp>
-      <p:sp>
-        <p:nvSpPr>
-          <p:cNvPr id="5" name="CaixaDeTexto 4">
-            <a:extLst>
-              <a:ext uri="{FF2B5EF4-FFF2-40B4-BE49-F238E27FC236}">
-                <a16:creationId xmlns:a16="http://schemas.microsoft.com/office/drawing/2014/main" id="{4AE81DB5-FA37-6E89-EDF5-43EC839FD5BC}"/>
-              </a:ext>
-            </a:extLst>
-          </p:cNvPr>
-          <p:cNvSpPr txBox="1"/>
-          <p:nvPr/>
-        </p:nvSpPr>
-        <p:spPr>
-          <a:xfrm>
-            <a:off x="4702997" y="76421"/>
-            <a:ext cx="3631507" cy="369332"/>
-          </a:xfrm>
-          <a:prstGeom prst="rect">
-            <a:avLst/>
-          </a:prstGeom>
-          <a:noFill/>
-        </p:spPr>
-        <p:txBody>
-          <a:bodyPr wrap="none" rtlCol="0">
-            <a:spAutoFit/>
-          </a:bodyPr>
-          <a:lstStyle/>
-          <a:p>
-            <a:r>
-              <a:rPr lang="pt-BR" dirty="0"/>
-              <a:t>O nome do </a:t>
-            </a:r>
-            <a:r>
-              <a:rPr lang="pt-BR" dirty="0" err="1"/>
-              <a:t>csv</a:t>
-            </a:r>
-            <a:r>
-              <a:rPr lang="pt-BR" dirty="0"/>
-              <a:t> deve ser “dados.csv”:</a:t>
-            </a:r>
-          </a:p>
-        </p:txBody>
-      </p:sp>
       <p:pic>
         <p:nvPicPr>
-          <p:cNvPr id="8" name="Imagem 7">
-            <a:extLst>
-              <a:ext uri="{FF2B5EF4-FFF2-40B4-BE49-F238E27FC236}">
-                <a16:creationId xmlns:a16="http://schemas.microsoft.com/office/drawing/2014/main" id="{AE6E8621-957F-8318-F896-D9116AEE7114}"/>
+          <p:cNvPr id="3" name="Imagem 2" descr="Logotipo, nome da empresa&#10;&#10;Descrição gerada automaticamente">
+            <a:extLst>
+              <a:ext uri="{FF2B5EF4-FFF2-40B4-BE49-F238E27FC236}">
+                <a16:creationId xmlns:a16="http://schemas.microsoft.com/office/drawing/2014/main" id="{9219A091-E0B1-F2E6-6576-3774CF1F89C6}"/>
               </a:ext>
             </a:extLst>
           </p:cNvPr>
@@ -5054,15 +4809,21 @@
           <p:nvPr/>
         </p:nvPicPr>
         <p:blipFill>
-          <a:blip r:embed="rId4"/>
+          <a:blip r:embed="rId4" cstate="print">
+            <a:extLst>
+              <a:ext uri="{28A0092B-C50C-407E-A947-70E740481C1C}">
+                <a14:useLocalDpi xmlns:a14="http://schemas.microsoft.com/office/drawing/2010/main" val="0"/>
+              </a:ext>
+            </a:extLst>
+          </a:blip>
           <a:stretch>
             <a:fillRect/>
           </a:stretch>
         </p:blipFill>
         <p:spPr>
           <a:xfrm>
-            <a:off x="2804932" y="883080"/>
-            <a:ext cx="7427639" cy="5745909"/>
+            <a:off x="10232571" y="6056502"/>
+            <a:ext cx="1730829" cy="803653"/>
           </a:xfrm>
           <a:prstGeom prst="rect">
             <a:avLst/>
@@ -5071,6 +4832,76 @@
       </p:pic>
       <p:sp>
         <p:nvSpPr>
+          <p:cNvPr id="2" name="Subtítulo 2">
+            <a:extLst>
+              <a:ext uri="{FF2B5EF4-FFF2-40B4-BE49-F238E27FC236}">
+                <a16:creationId xmlns:a16="http://schemas.microsoft.com/office/drawing/2014/main" id="{EC625675-72F7-A912-8106-0A7A83555282}"/>
+              </a:ext>
+            </a:extLst>
+          </p:cNvPr>
+          <p:cNvSpPr>
+            <a:spLocks noGrp="1"/>
+          </p:cNvSpPr>
+          <p:nvPr>
+            <p:ph type="subTitle" idx="1"/>
+          </p:nvPr>
+        </p:nvSpPr>
+        <p:spPr>
+          <a:xfrm>
+            <a:off x="0" y="0"/>
+            <a:ext cx="2804932" cy="1655762"/>
+          </a:xfrm>
+        </p:spPr>
+        <p:txBody>
+          <a:bodyPr>
+            <a:normAutofit/>
+          </a:bodyPr>
+          <a:lstStyle/>
+          <a:p>
+            <a:r>
+              <a:rPr lang="pt-BR" sz="4000" dirty="0"/>
+              <a:t>IW</a:t>
+            </a:r>
+          </a:p>
+        </p:txBody>
+      </p:sp>
+      <p:sp>
+        <p:nvSpPr>
+          <p:cNvPr id="5" name="CaixaDeTexto 4">
+            <a:extLst>
+              <a:ext uri="{FF2B5EF4-FFF2-40B4-BE49-F238E27FC236}">
+                <a16:creationId xmlns:a16="http://schemas.microsoft.com/office/drawing/2014/main" id="{4AE81DB5-FA37-6E89-EDF5-43EC839FD5BC}"/>
+              </a:ext>
+            </a:extLst>
+          </p:cNvPr>
+          <p:cNvSpPr txBox="1"/>
+          <p:nvPr/>
+        </p:nvSpPr>
+        <p:spPr>
+          <a:xfrm>
+            <a:off x="4702997" y="76421"/>
+            <a:ext cx="3698577" cy="369332"/>
+          </a:xfrm>
+          <a:prstGeom prst="rect">
+            <a:avLst/>
+          </a:prstGeom>
+          <a:noFill/>
+        </p:spPr>
+        <p:txBody>
+          <a:bodyPr wrap="none" rtlCol="0">
+            <a:spAutoFit/>
+          </a:bodyPr>
+          <a:lstStyle/>
+          <a:p>
+            <a:r>
+              <a:rPr lang="pt-BR" dirty="0"/>
+              <a:t>O nome do arquivo deve ser “dados”:</a:t>
+            </a:r>
+          </a:p>
+        </p:txBody>
+      </p:sp>
+      <p:sp>
+        <p:nvSpPr>
           <p:cNvPr id="11" name="Retângulo 10">
             <a:extLst>
               <a:ext uri="{FF2B5EF4-FFF2-40B4-BE49-F238E27FC236}">
@@ -5083,8 +4914,8 @@
         </p:nvSpPr>
         <p:spPr>
           <a:xfrm>
-            <a:off x="3909060" y="5269230"/>
-            <a:ext cx="1141549" cy="250950"/>
+            <a:off x="5566411" y="5405783"/>
+            <a:ext cx="529590" cy="229207"/>
           </a:xfrm>
           <a:prstGeom prst="rect">
             <a:avLst/>
@@ -5133,13 +4964,14 @@
           <p:cNvCxnSpPr>
             <a:cxnSpLocks/>
             <a:stCxn id="13" idx="1"/>
+            <a:endCxn id="10" idx="0"/>
           </p:cNvCxnSpPr>
           <p:nvPr/>
         </p:nvCxnSpPr>
         <p:spPr>
           <a:xfrm flipH="1">
-            <a:off x="8972550" y="4816696"/>
-            <a:ext cx="1666614" cy="886874"/>
+            <a:off x="7271725" y="4816696"/>
+            <a:ext cx="3367439" cy="1068471"/>
           </a:xfrm>
           <a:prstGeom prst="straightConnector1">
             <a:avLst/>
@@ -5226,8 +5058,8 @@
         </p:nvSpPr>
         <p:spPr>
           <a:xfrm>
-            <a:off x="8245519" y="5723970"/>
-            <a:ext cx="1141549" cy="250950"/>
+            <a:off x="6885349" y="5885167"/>
+            <a:ext cx="772751" cy="197873"/>
           </a:xfrm>
           <a:prstGeom prst="rect">
             <a:avLst/>

</xml_diff>

<commit_message>
Exibindo em console e Label, data frame importado a partir da 1 linha e determinadas colunas
</commit_message>
<xml_diff>
--- a/log.pptx
+++ b/log.pptx
@@ -6,10 +6,9 @@
   </p:sldMasterIdLst>
   <p:sldIdLst>
     <p:sldId id="263" r:id="rId2"/>
-    <p:sldId id="266" r:id="rId3"/>
-    <p:sldId id="267" r:id="rId4"/>
-    <p:sldId id="268" r:id="rId5"/>
-    <p:sldId id="265" r:id="rId6"/>
+    <p:sldId id="269" r:id="rId3"/>
+    <p:sldId id="270" r:id="rId4"/>
+    <p:sldId id="265" r:id="rId5"/>
   </p:sldIdLst>
   <p:sldSz cx="12192000" cy="6858000"/>
   <p:notesSz cx="6858000" cy="9144000"/>
@@ -263,7 +262,7 @@
           <a:p>
             <a:fld id="{66C6D18E-06BD-430D-8E88-D467113632A0}" type="datetimeFigureOut">
               <a:rPr lang="pt-BR" smtClean="0"/>
-              <a:t>10/04/2024</a:t>
+              <a:t>12/04/2024</a:t>
             </a:fld>
             <a:endParaRPr lang="pt-BR"/>
           </a:p>
@@ -461,7 +460,7 @@
           <a:p>
             <a:fld id="{66C6D18E-06BD-430D-8E88-D467113632A0}" type="datetimeFigureOut">
               <a:rPr lang="pt-BR" smtClean="0"/>
-              <a:t>10/04/2024</a:t>
+              <a:t>12/04/2024</a:t>
             </a:fld>
             <a:endParaRPr lang="pt-BR"/>
           </a:p>
@@ -669,7 +668,7 @@
           <a:p>
             <a:fld id="{66C6D18E-06BD-430D-8E88-D467113632A0}" type="datetimeFigureOut">
               <a:rPr lang="pt-BR" smtClean="0"/>
-              <a:t>10/04/2024</a:t>
+              <a:t>12/04/2024</a:t>
             </a:fld>
             <a:endParaRPr lang="pt-BR"/>
           </a:p>
@@ -867,7 +866,7 @@
           <a:p>
             <a:fld id="{66C6D18E-06BD-430D-8E88-D467113632A0}" type="datetimeFigureOut">
               <a:rPr lang="pt-BR" smtClean="0"/>
-              <a:t>10/04/2024</a:t>
+              <a:t>12/04/2024</a:t>
             </a:fld>
             <a:endParaRPr lang="pt-BR"/>
           </a:p>
@@ -1142,7 +1141,7 @@
           <a:p>
             <a:fld id="{66C6D18E-06BD-430D-8E88-D467113632A0}" type="datetimeFigureOut">
               <a:rPr lang="pt-BR" smtClean="0"/>
-              <a:t>10/04/2024</a:t>
+              <a:t>12/04/2024</a:t>
             </a:fld>
             <a:endParaRPr lang="pt-BR"/>
           </a:p>
@@ -1407,7 +1406,7 @@
           <a:p>
             <a:fld id="{66C6D18E-06BD-430D-8E88-D467113632A0}" type="datetimeFigureOut">
               <a:rPr lang="pt-BR" smtClean="0"/>
-              <a:t>10/04/2024</a:t>
+              <a:t>12/04/2024</a:t>
             </a:fld>
             <a:endParaRPr lang="pt-BR"/>
           </a:p>
@@ -1819,7 +1818,7 @@
           <a:p>
             <a:fld id="{66C6D18E-06BD-430D-8E88-D467113632A0}" type="datetimeFigureOut">
               <a:rPr lang="pt-BR" smtClean="0"/>
-              <a:t>10/04/2024</a:t>
+              <a:t>12/04/2024</a:t>
             </a:fld>
             <a:endParaRPr lang="pt-BR"/>
           </a:p>
@@ -1960,7 +1959,7 @@
           <a:p>
             <a:fld id="{66C6D18E-06BD-430D-8E88-D467113632A0}" type="datetimeFigureOut">
               <a:rPr lang="pt-BR" smtClean="0"/>
-              <a:t>10/04/2024</a:t>
+              <a:t>12/04/2024</a:t>
             </a:fld>
             <a:endParaRPr lang="pt-BR"/>
           </a:p>
@@ -2073,7 +2072,7 @@
           <a:p>
             <a:fld id="{66C6D18E-06BD-430D-8E88-D467113632A0}" type="datetimeFigureOut">
               <a:rPr lang="pt-BR" smtClean="0"/>
-              <a:t>10/04/2024</a:t>
+              <a:t>12/04/2024</a:t>
             </a:fld>
             <a:endParaRPr lang="pt-BR"/>
           </a:p>
@@ -2384,7 +2383,7 @@
           <a:p>
             <a:fld id="{66C6D18E-06BD-430D-8E88-D467113632A0}" type="datetimeFigureOut">
               <a:rPr lang="pt-BR" smtClean="0"/>
-              <a:t>10/04/2024</a:t>
+              <a:t>12/04/2024</a:t>
             </a:fld>
             <a:endParaRPr lang="pt-BR"/>
           </a:p>
@@ -2672,7 +2671,7 @@
           <a:p>
             <a:fld id="{66C6D18E-06BD-430D-8E88-D467113632A0}" type="datetimeFigureOut">
               <a:rPr lang="pt-BR" smtClean="0"/>
-              <a:t>10/04/2024</a:t>
+              <a:t>12/04/2024</a:t>
             </a:fld>
             <a:endParaRPr lang="pt-BR"/>
           </a:p>
@@ -2913,7 +2912,7 @@
           <a:p>
             <a:fld id="{66C6D18E-06BD-430D-8E88-D467113632A0}" type="datetimeFigureOut">
               <a:rPr lang="pt-BR" smtClean="0"/>
-              <a:t>10/04/2024</a:t>
+              <a:t>12/04/2024</a:t>
             </a:fld>
             <a:endParaRPr lang="pt-BR"/>
           </a:p>
@@ -3968,55 +3967,12 @@
           </a:p>
         </p:txBody>
       </p:sp>
-      <p:sp>
-        <p:nvSpPr>
-          <p:cNvPr id="5" name="CaixaDeTexto 4">
-            <a:extLst>
-              <a:ext uri="{FF2B5EF4-FFF2-40B4-BE49-F238E27FC236}">
-                <a16:creationId xmlns:a16="http://schemas.microsoft.com/office/drawing/2014/main" id="{4AE81DB5-FA37-6E89-EDF5-43EC839FD5BC}"/>
-              </a:ext>
-            </a:extLst>
-          </p:cNvPr>
-          <p:cNvSpPr txBox="1"/>
-          <p:nvPr/>
-        </p:nvSpPr>
-        <p:spPr>
-          <a:xfrm>
-            <a:off x="2784067" y="76421"/>
-            <a:ext cx="6705875" cy="369332"/>
-          </a:xfrm>
-          <a:prstGeom prst="rect">
-            <a:avLst/>
-          </a:prstGeom>
-          <a:noFill/>
-        </p:spPr>
-        <p:txBody>
-          <a:bodyPr wrap="none" rtlCol="0">
-            <a:spAutoFit/>
-          </a:bodyPr>
-          <a:lstStyle/>
-          <a:p>
-            <a:r>
-              <a:rPr lang="pt-BR" dirty="0"/>
-              <a:t>Extração de “</a:t>
-            </a:r>
-            <a:r>
-              <a:rPr lang="pt-BR" dirty="0" err="1"/>
-              <a:t>Fech</a:t>
-            </a:r>
-            <a:r>
-              <a:rPr lang="pt-BR" dirty="0"/>
-              <a:t>. Estoque – Informações Complementares” em PDF:</a:t>
-            </a:r>
-          </a:p>
-        </p:txBody>
-      </p:sp>
       <p:pic>
         <p:nvPicPr>
-          <p:cNvPr id="8" name="Imagem 7">
-            <a:extLst>
-              <a:ext uri="{FF2B5EF4-FFF2-40B4-BE49-F238E27FC236}">
-                <a16:creationId xmlns:a16="http://schemas.microsoft.com/office/drawing/2014/main" id="{F6A67949-A05C-8ECF-CC76-2037954754DE}"/>
+          <p:cNvPr id="7" name="Imagem 6">
+            <a:extLst>
+              <a:ext uri="{FF2B5EF4-FFF2-40B4-BE49-F238E27FC236}">
+                <a16:creationId xmlns:a16="http://schemas.microsoft.com/office/drawing/2014/main" id="{4EA34A81-4294-39A8-60D3-2AF002519FED}"/>
               </a:ext>
             </a:extLst>
           </p:cNvPr>
@@ -4033,14 +3989,49 @@
         </p:blipFill>
         <p:spPr>
           <a:xfrm>
-            <a:off x="2804933" y="883080"/>
-            <a:ext cx="7324742" cy="5666310"/>
+            <a:off x="1955312" y="794887"/>
+            <a:ext cx="8281375" cy="5776155"/>
           </a:xfrm>
           <a:prstGeom prst="rect">
             <a:avLst/>
           </a:prstGeom>
         </p:spPr>
       </p:pic>
+      <p:sp>
+        <p:nvSpPr>
+          <p:cNvPr id="5" name="CaixaDeTexto 4">
+            <a:extLst>
+              <a:ext uri="{FF2B5EF4-FFF2-40B4-BE49-F238E27FC236}">
+                <a16:creationId xmlns:a16="http://schemas.microsoft.com/office/drawing/2014/main" id="{4AE81DB5-FA37-6E89-EDF5-43EC839FD5BC}"/>
+              </a:ext>
+            </a:extLst>
+          </p:cNvPr>
+          <p:cNvSpPr txBox="1"/>
+          <p:nvPr/>
+        </p:nvSpPr>
+        <p:spPr>
+          <a:xfrm>
+            <a:off x="2784067" y="76421"/>
+            <a:ext cx="6229719" cy="369332"/>
+          </a:xfrm>
+          <a:prstGeom prst="rect">
+            <a:avLst/>
+          </a:prstGeom>
+          <a:noFill/>
+        </p:spPr>
+        <p:txBody>
+          <a:bodyPr wrap="none" rtlCol="0">
+            <a:spAutoFit/>
+          </a:bodyPr>
+          <a:lstStyle/>
+          <a:p>
+            <a:r>
+              <a:rPr lang="pt-BR" dirty="0"/>
+              <a:t>Extração de “Fechamento do Estoque para Exportação em 	XLSX:</a:t>
+            </a:r>
+          </a:p>
+        </p:txBody>
+      </p:sp>
       <p:sp>
         <p:nvSpPr>
           <p:cNvPr id="11" name="Retângulo 10">
@@ -4109,8 +4100,8 @@
         </p:nvSpPr>
         <p:spPr>
           <a:xfrm>
-            <a:off x="7696014" y="3063240"/>
-            <a:ext cx="1942012" cy="195068"/>
+            <a:off x="6415854" y="3794760"/>
+            <a:ext cx="2202366" cy="217170"/>
           </a:xfrm>
           <a:prstGeom prst="rect">
             <a:avLst/>
@@ -4212,8 +4203,8 @@
         </p:nvCxnSpPr>
         <p:spPr>
           <a:xfrm flipH="1">
-            <a:off x="8667020" y="1753919"/>
-            <a:ext cx="1751211" cy="1309321"/>
+            <a:off x="7517037" y="1753919"/>
+            <a:ext cx="2901194" cy="2040841"/>
           </a:xfrm>
           <a:prstGeom prst="straightConnector1">
             <a:avLst/>
@@ -4245,7 +4236,7 @@
     </p:spTree>
     <p:extLst>
       <p:ext uri="{BB962C8B-B14F-4D97-AF65-F5344CB8AC3E}">
-        <p14:creationId xmlns:p14="http://schemas.microsoft.com/office/powerpoint/2010/main" val="711344057"/>
+        <p14:creationId xmlns:p14="http://schemas.microsoft.com/office/powerpoint/2010/main" val="4071526309"/>
       </p:ext>
     </p:extLst>
   </p:cSld>
@@ -4440,7 +4431,7 @@
           <p:cNvPr id="7" name="Imagem 6">
             <a:extLst>
               <a:ext uri="{FF2B5EF4-FFF2-40B4-BE49-F238E27FC236}">
-                <a16:creationId xmlns:a16="http://schemas.microsoft.com/office/drawing/2014/main" id="{5C817DFF-51B6-602E-355E-8A6AB5DFDCED}"/>
+                <a16:creationId xmlns:a16="http://schemas.microsoft.com/office/drawing/2014/main" id="{E50F27A4-9AFC-F4E3-8DAF-E8C7D0A51CE3}"/>
               </a:ext>
             </a:extLst>
           </p:cNvPr>
@@ -4457,8 +4448,8 @@
         </p:blipFill>
         <p:spPr>
           <a:xfrm>
-            <a:off x="2553974" y="675866"/>
-            <a:ext cx="7678597" cy="5968395"/>
+            <a:off x="747660" y="977566"/>
+            <a:ext cx="10256823" cy="5206064"/>
           </a:xfrm>
           <a:prstGeom prst="rect">
             <a:avLst/>
@@ -4550,8 +4541,8 @@
         </p:nvSpPr>
         <p:spPr>
           <a:xfrm>
-            <a:off x="4844856" y="75996"/>
-            <a:ext cx="2581091" cy="369332"/>
+            <a:off x="2784067" y="76421"/>
+            <a:ext cx="6705875" cy="369332"/>
           </a:xfrm>
           <a:prstGeom prst="rect">
             <a:avLst/>
@@ -4566,15 +4557,170 @@
           <a:p>
             <a:r>
               <a:rPr lang="pt-BR" dirty="0"/>
-              <a:t>Exportar arquivo em PDF:</a:t>
-            </a:r>
-          </a:p>
-        </p:txBody>
-      </p:sp>
+              <a:t>Extração de “</a:t>
+            </a:r>
+            <a:r>
+              <a:rPr lang="pt-BR" dirty="0" err="1"/>
+              <a:t>Fech</a:t>
+            </a:r>
+            <a:r>
+              <a:rPr lang="pt-BR" dirty="0"/>
+              <a:t>. Estoque – Informações Complementares” em PDF:</a:t>
+            </a:r>
+          </a:p>
+        </p:txBody>
+      </p:sp>
+      <p:sp>
+        <p:nvSpPr>
+          <p:cNvPr id="9" name="Retângulo 8">
+            <a:extLst>
+              <a:ext uri="{FF2B5EF4-FFF2-40B4-BE49-F238E27FC236}">
+                <a16:creationId xmlns:a16="http://schemas.microsoft.com/office/drawing/2014/main" id="{AE4BBD00-4E66-A6ED-9081-B367C91B0B37}"/>
+              </a:ext>
+            </a:extLst>
+          </p:cNvPr>
+          <p:cNvSpPr/>
+          <p:nvPr/>
+        </p:nvSpPr>
+        <p:spPr>
+          <a:xfrm>
+            <a:off x="6725008" y="1153881"/>
+            <a:ext cx="1942012" cy="269437"/>
+          </a:xfrm>
+          <a:prstGeom prst="rect">
+            <a:avLst/>
+          </a:prstGeom>
+          <a:noFill/>
+          <a:ln w="38100">
+            <a:solidFill>
+              <a:schemeClr val="accent6">
+                <a:lumMod val="50000"/>
+              </a:schemeClr>
+            </a:solidFill>
+          </a:ln>
+        </p:spPr>
+        <p:style>
+          <a:lnRef idx="2">
+            <a:schemeClr val="accent1">
+              <a:shade val="15000"/>
+            </a:schemeClr>
+          </a:lnRef>
+          <a:fillRef idx="1">
+            <a:schemeClr val="accent1"/>
+          </a:fillRef>
+          <a:effectRef idx="0">
+            <a:schemeClr val="accent1"/>
+          </a:effectRef>
+          <a:fontRef idx="minor">
+            <a:schemeClr val="lt1"/>
+          </a:fontRef>
+        </p:style>
+        <p:txBody>
+          <a:bodyPr rtlCol="0" anchor="ctr"/>
+          <a:lstStyle/>
+          <a:p>
+            <a:pPr algn="ctr"/>
+            <a:endParaRPr lang="pt-BR"/>
+          </a:p>
+        </p:txBody>
+      </p:sp>
+      <p:sp>
+        <p:nvSpPr>
+          <p:cNvPr id="10" name="CaixaDeTexto 9">
+            <a:extLst>
+              <a:ext uri="{FF2B5EF4-FFF2-40B4-BE49-F238E27FC236}">
+                <a16:creationId xmlns:a16="http://schemas.microsoft.com/office/drawing/2014/main" id="{75131CBF-605E-8072-583C-5D86BC93FE1F}"/>
+              </a:ext>
+            </a:extLst>
+          </p:cNvPr>
+          <p:cNvSpPr txBox="1"/>
+          <p:nvPr/>
+        </p:nvSpPr>
+        <p:spPr>
+          <a:xfrm>
+            <a:off x="9387068" y="830717"/>
+            <a:ext cx="2804932" cy="646331"/>
+          </a:xfrm>
+          <a:prstGeom prst="rect">
+            <a:avLst/>
+          </a:prstGeom>
+          <a:solidFill>
+            <a:schemeClr val="bg1"/>
+          </a:solidFill>
+          <a:ln w="38100">
+            <a:solidFill>
+              <a:schemeClr val="accent6">
+                <a:lumMod val="50000"/>
+              </a:schemeClr>
+            </a:solidFill>
+          </a:ln>
+        </p:spPr>
+        <p:txBody>
+          <a:bodyPr wrap="square" rtlCol="0">
+            <a:spAutoFit/>
+          </a:bodyPr>
+          <a:lstStyle/>
+          <a:p>
+            <a:pPr algn="ctr"/>
+            <a:r>
+              <a:rPr lang="pt-BR" dirty="0"/>
+              <a:t>Selecione esta opção de relatório</a:t>
+            </a:r>
+          </a:p>
+        </p:txBody>
+      </p:sp>
+      <p:cxnSp>
+        <p:nvCxnSpPr>
+          <p:cNvPr id="14" name="Conector de Seta Reta 13">
+            <a:extLst>
+              <a:ext uri="{FF2B5EF4-FFF2-40B4-BE49-F238E27FC236}">
+                <a16:creationId xmlns:a16="http://schemas.microsoft.com/office/drawing/2014/main" id="{A1E58DB3-1899-6B9E-3B6D-BA5D9DB1B4C4}"/>
+              </a:ext>
+            </a:extLst>
+          </p:cNvPr>
+          <p:cNvCxnSpPr>
+            <a:cxnSpLocks/>
+            <a:stCxn id="10" idx="2"/>
+            <a:endCxn id="9" idx="0"/>
+          </p:cNvCxnSpPr>
+          <p:nvPr/>
+        </p:nvCxnSpPr>
+        <p:spPr>
+          <a:xfrm flipH="1" flipV="1">
+            <a:off x="7696014" y="1153881"/>
+            <a:ext cx="3093520" cy="323167"/>
+          </a:xfrm>
+          <a:prstGeom prst="straightConnector1">
+            <a:avLst/>
+          </a:prstGeom>
+          <a:ln>
+            <a:solidFill>
+              <a:schemeClr val="accent6">
+                <a:lumMod val="50000"/>
+              </a:schemeClr>
+            </a:solidFill>
+            <a:tailEnd type="triangle"/>
+          </a:ln>
+        </p:spPr>
+        <p:style>
+          <a:lnRef idx="1">
+            <a:schemeClr val="accent1"/>
+          </a:lnRef>
+          <a:fillRef idx="0">
+            <a:schemeClr val="accent1"/>
+          </a:fillRef>
+          <a:effectRef idx="0">
+            <a:schemeClr val="accent1"/>
+          </a:effectRef>
+          <a:fontRef idx="minor">
+            <a:schemeClr val="tx1"/>
+          </a:fontRef>
+        </p:style>
+      </p:cxnSp>
     </p:spTree>
     <p:extLst>
       <p:ext uri="{BB962C8B-B14F-4D97-AF65-F5344CB8AC3E}">
-        <p14:creationId xmlns:p14="http://schemas.microsoft.com/office/powerpoint/2010/main" val="1700191297"/>
+        <p14:creationId xmlns:p14="http://schemas.microsoft.com/office/powerpoint/2010/main" val="3919983984"/>
       </p:ext>
     </p:extLst>
   </p:cSld>
@@ -4706,533 +4852,6 @@
 </file>
 
 <file path=ppt/slides/slide4.xml><?xml version="1.0" encoding="utf-8"?>
-<p:sld xmlns:a="http://schemas.openxmlformats.org/drawingml/2006/main" xmlns:r="http://schemas.openxmlformats.org/officeDocument/2006/relationships" xmlns:p="http://schemas.openxmlformats.org/presentationml/2006/main">
-  <p:cSld>
-    <p:spTree>
-      <p:nvGrpSpPr>
-        <p:cNvPr id="1" name="">
-          <a:extLst>
-            <a:ext uri="{FF2B5EF4-FFF2-40B4-BE49-F238E27FC236}">
-              <a16:creationId xmlns:a16="http://schemas.microsoft.com/office/drawing/2014/main" id="{072F9902-A18D-52C7-DD8C-8110FE6E5BC0}"/>
-            </a:ext>
-          </a:extLst>
-        </p:cNvPr>
-        <p:cNvGrpSpPr/>
-        <p:nvPr/>
-      </p:nvGrpSpPr>
-      <p:grpSpPr>
-        <a:xfrm>
-          <a:off x="0" y="0"/>
-          <a:ext cx="0" cy="0"/>
-          <a:chOff x="0" y="0"/>
-          <a:chExt cx="0" cy="0"/>
-        </a:xfrm>
-      </p:grpSpPr>
-      <p:pic>
-        <p:nvPicPr>
-          <p:cNvPr id="4" name="Imagem 3">
-            <a:extLst>
-              <a:ext uri="{FF2B5EF4-FFF2-40B4-BE49-F238E27FC236}">
-                <a16:creationId xmlns:a16="http://schemas.microsoft.com/office/drawing/2014/main" id="{7CFED5FB-B9E2-E3A7-C509-326DF5F1A33A}"/>
-              </a:ext>
-            </a:extLst>
-          </p:cNvPr>
-          <p:cNvPicPr>
-            <a:picLocks noChangeAspect="1"/>
-          </p:cNvPicPr>
-          <p:nvPr/>
-        </p:nvPicPr>
-        <p:blipFill>
-          <a:blip r:embed="rId2">
-            <a:extLst>
-              <a:ext uri="{28A0092B-C50C-407E-A947-70E740481C1C}">
-                <a14:useLocalDpi xmlns:a14="http://schemas.microsoft.com/office/drawing/2010/main" val="0"/>
-              </a:ext>
-            </a:extLst>
-          </a:blip>
-          <a:stretch>
-            <a:fillRect/>
-          </a:stretch>
-        </p:blipFill>
-        <p:spPr>
-          <a:xfrm>
-            <a:off x="0" y="0"/>
-            <a:ext cx="12192000" cy="6858000"/>
-          </a:xfrm>
-          <a:prstGeom prst="rect">
-            <a:avLst/>
-          </a:prstGeom>
-        </p:spPr>
-      </p:pic>
-      <p:pic>
-        <p:nvPicPr>
-          <p:cNvPr id="7" name="Imagem 6">
-            <a:extLst>
-              <a:ext uri="{FF2B5EF4-FFF2-40B4-BE49-F238E27FC236}">
-                <a16:creationId xmlns:a16="http://schemas.microsoft.com/office/drawing/2014/main" id="{53A529C6-E2F1-0B83-F2D5-F315D034A26C}"/>
-              </a:ext>
-            </a:extLst>
-          </p:cNvPr>
-          <p:cNvPicPr>
-            <a:picLocks noChangeAspect="1"/>
-          </p:cNvPicPr>
-          <p:nvPr/>
-        </p:nvPicPr>
-        <p:blipFill>
-          <a:blip r:embed="rId3"/>
-          <a:stretch>
-            <a:fillRect/>
-          </a:stretch>
-        </p:blipFill>
-        <p:spPr>
-          <a:xfrm>
-            <a:off x="2804932" y="873896"/>
-            <a:ext cx="7199040" cy="5589156"/>
-          </a:xfrm>
-          <a:prstGeom prst="rect">
-            <a:avLst/>
-          </a:prstGeom>
-        </p:spPr>
-      </p:pic>
-      <p:pic>
-        <p:nvPicPr>
-          <p:cNvPr id="3" name="Imagem 2" descr="Logotipo, nome da empresa&#10;&#10;Descrição gerada automaticamente">
-            <a:extLst>
-              <a:ext uri="{FF2B5EF4-FFF2-40B4-BE49-F238E27FC236}">
-                <a16:creationId xmlns:a16="http://schemas.microsoft.com/office/drawing/2014/main" id="{9219A091-E0B1-F2E6-6576-3774CF1F89C6}"/>
-              </a:ext>
-            </a:extLst>
-          </p:cNvPr>
-          <p:cNvPicPr>
-            <a:picLocks noChangeAspect="1"/>
-          </p:cNvPicPr>
-          <p:nvPr/>
-        </p:nvPicPr>
-        <p:blipFill>
-          <a:blip r:embed="rId4" cstate="print">
-            <a:extLst>
-              <a:ext uri="{28A0092B-C50C-407E-A947-70E740481C1C}">
-                <a14:useLocalDpi xmlns:a14="http://schemas.microsoft.com/office/drawing/2010/main" val="0"/>
-              </a:ext>
-            </a:extLst>
-          </a:blip>
-          <a:stretch>
-            <a:fillRect/>
-          </a:stretch>
-        </p:blipFill>
-        <p:spPr>
-          <a:xfrm>
-            <a:off x="10232571" y="6056502"/>
-            <a:ext cx="1730829" cy="803653"/>
-          </a:xfrm>
-          <a:prstGeom prst="rect">
-            <a:avLst/>
-          </a:prstGeom>
-        </p:spPr>
-      </p:pic>
-      <p:sp>
-        <p:nvSpPr>
-          <p:cNvPr id="2" name="Subtítulo 2">
-            <a:extLst>
-              <a:ext uri="{FF2B5EF4-FFF2-40B4-BE49-F238E27FC236}">
-                <a16:creationId xmlns:a16="http://schemas.microsoft.com/office/drawing/2014/main" id="{EC625675-72F7-A912-8106-0A7A83555282}"/>
-              </a:ext>
-            </a:extLst>
-          </p:cNvPr>
-          <p:cNvSpPr>
-            <a:spLocks noGrp="1"/>
-          </p:cNvSpPr>
-          <p:nvPr>
-            <p:ph type="subTitle" idx="1"/>
-          </p:nvPr>
-        </p:nvSpPr>
-        <p:spPr>
-          <a:xfrm>
-            <a:off x="0" y="0"/>
-            <a:ext cx="2804932" cy="1655762"/>
-          </a:xfrm>
-        </p:spPr>
-        <p:txBody>
-          <a:bodyPr>
-            <a:normAutofit/>
-          </a:bodyPr>
-          <a:lstStyle/>
-          <a:p>
-            <a:r>
-              <a:rPr lang="pt-BR" sz="4000" dirty="0"/>
-              <a:t>IW</a:t>
-            </a:r>
-          </a:p>
-        </p:txBody>
-      </p:sp>
-      <p:sp>
-        <p:nvSpPr>
-          <p:cNvPr id="5" name="CaixaDeTexto 4">
-            <a:extLst>
-              <a:ext uri="{FF2B5EF4-FFF2-40B4-BE49-F238E27FC236}">
-                <a16:creationId xmlns:a16="http://schemas.microsoft.com/office/drawing/2014/main" id="{4AE81DB5-FA37-6E89-EDF5-43EC839FD5BC}"/>
-              </a:ext>
-            </a:extLst>
-          </p:cNvPr>
-          <p:cNvSpPr txBox="1"/>
-          <p:nvPr/>
-        </p:nvSpPr>
-        <p:spPr>
-          <a:xfrm>
-            <a:off x="4702997" y="76421"/>
-            <a:ext cx="3698577" cy="369332"/>
-          </a:xfrm>
-          <a:prstGeom prst="rect">
-            <a:avLst/>
-          </a:prstGeom>
-          <a:noFill/>
-        </p:spPr>
-        <p:txBody>
-          <a:bodyPr wrap="none" rtlCol="0">
-            <a:spAutoFit/>
-          </a:bodyPr>
-          <a:lstStyle/>
-          <a:p>
-            <a:r>
-              <a:rPr lang="pt-BR" dirty="0"/>
-              <a:t>O nome do arquivo deve ser “dados”:</a:t>
-            </a:r>
-          </a:p>
-        </p:txBody>
-      </p:sp>
-      <p:sp>
-        <p:nvSpPr>
-          <p:cNvPr id="11" name="Retângulo 10">
-            <a:extLst>
-              <a:ext uri="{FF2B5EF4-FFF2-40B4-BE49-F238E27FC236}">
-                <a16:creationId xmlns:a16="http://schemas.microsoft.com/office/drawing/2014/main" id="{5C7D2F4E-4E8C-5186-CA17-29F7E70E2748}"/>
-              </a:ext>
-            </a:extLst>
-          </p:cNvPr>
-          <p:cNvSpPr/>
-          <p:nvPr/>
-        </p:nvSpPr>
-        <p:spPr>
-          <a:xfrm>
-            <a:off x="5566411" y="5405783"/>
-            <a:ext cx="529590" cy="229207"/>
-          </a:xfrm>
-          <a:prstGeom prst="rect">
-            <a:avLst/>
-          </a:prstGeom>
-          <a:noFill/>
-          <a:ln w="38100">
-            <a:solidFill>
-              <a:srgbClr val="C00000"/>
-            </a:solidFill>
-          </a:ln>
-        </p:spPr>
-        <p:style>
-          <a:lnRef idx="2">
-            <a:schemeClr val="accent1">
-              <a:shade val="15000"/>
-            </a:schemeClr>
-          </a:lnRef>
-          <a:fillRef idx="1">
-            <a:schemeClr val="accent1"/>
-          </a:fillRef>
-          <a:effectRef idx="0">
-            <a:schemeClr val="accent1"/>
-          </a:effectRef>
-          <a:fontRef idx="minor">
-            <a:schemeClr val="lt1"/>
-          </a:fontRef>
-        </p:style>
-        <p:txBody>
-          <a:bodyPr rtlCol="0" anchor="ctr"/>
-          <a:lstStyle/>
-          <a:p>
-            <a:pPr algn="ctr"/>
-            <a:endParaRPr lang="pt-BR"/>
-          </a:p>
-        </p:txBody>
-      </p:sp>
-      <p:cxnSp>
-        <p:nvCxnSpPr>
-          <p:cNvPr id="14" name="Conector de Seta Reta 13">
-            <a:extLst>
-              <a:ext uri="{FF2B5EF4-FFF2-40B4-BE49-F238E27FC236}">
-                <a16:creationId xmlns:a16="http://schemas.microsoft.com/office/drawing/2014/main" id="{A1E58DB3-1899-6B9E-3B6D-BA5D9DB1B4C4}"/>
-              </a:ext>
-            </a:extLst>
-          </p:cNvPr>
-          <p:cNvCxnSpPr>
-            <a:cxnSpLocks/>
-            <a:stCxn id="13" idx="1"/>
-            <a:endCxn id="10" idx="0"/>
-          </p:cNvCxnSpPr>
-          <p:nvPr/>
-        </p:nvCxnSpPr>
-        <p:spPr>
-          <a:xfrm flipH="1">
-            <a:off x="7271725" y="4816696"/>
-            <a:ext cx="3367439" cy="1068471"/>
-          </a:xfrm>
-          <a:prstGeom prst="straightConnector1">
-            <a:avLst/>
-          </a:prstGeom>
-          <a:ln>
-            <a:solidFill>
-              <a:schemeClr val="accent6">
-                <a:lumMod val="50000"/>
-              </a:schemeClr>
-            </a:solidFill>
-            <a:tailEnd type="triangle"/>
-          </a:ln>
-        </p:spPr>
-        <p:style>
-          <a:lnRef idx="1">
-            <a:schemeClr val="accent1"/>
-          </a:lnRef>
-          <a:fillRef idx="0">
-            <a:schemeClr val="accent1"/>
-          </a:fillRef>
-          <a:effectRef idx="0">
-            <a:schemeClr val="accent1"/>
-          </a:effectRef>
-          <a:fontRef idx="minor">
-            <a:schemeClr val="tx1"/>
-          </a:fontRef>
-        </p:style>
-      </p:cxnSp>
-      <p:sp>
-        <p:nvSpPr>
-          <p:cNvPr id="13" name="CaixaDeTexto 12">
-            <a:extLst>
-              <a:ext uri="{FF2B5EF4-FFF2-40B4-BE49-F238E27FC236}">
-                <a16:creationId xmlns:a16="http://schemas.microsoft.com/office/drawing/2014/main" id="{B6293388-73E5-0005-F02B-57445E52ADCA}"/>
-              </a:ext>
-            </a:extLst>
-          </p:cNvPr>
-          <p:cNvSpPr txBox="1"/>
-          <p:nvPr/>
-        </p:nvSpPr>
-        <p:spPr>
-          <a:xfrm>
-            <a:off x="10639164" y="4632030"/>
-            <a:ext cx="734737" cy="369332"/>
-          </a:xfrm>
-          <a:prstGeom prst="rect">
-            <a:avLst/>
-          </a:prstGeom>
-          <a:solidFill>
-            <a:schemeClr val="bg1"/>
-          </a:solidFill>
-          <a:ln w="38100">
-            <a:solidFill>
-              <a:schemeClr val="accent6">
-                <a:lumMod val="50000"/>
-              </a:schemeClr>
-            </a:solidFill>
-          </a:ln>
-        </p:spPr>
-        <p:txBody>
-          <a:bodyPr wrap="square" rtlCol="0">
-            <a:spAutoFit/>
-          </a:bodyPr>
-          <a:lstStyle/>
-          <a:p>
-            <a:r>
-              <a:rPr lang="pt-BR" dirty="0"/>
-              <a:t>CLICK</a:t>
-            </a:r>
-          </a:p>
-        </p:txBody>
-      </p:sp>
-      <p:sp>
-        <p:nvSpPr>
-          <p:cNvPr id="10" name="Retângulo 9">
-            <a:extLst>
-              <a:ext uri="{FF2B5EF4-FFF2-40B4-BE49-F238E27FC236}">
-                <a16:creationId xmlns:a16="http://schemas.microsoft.com/office/drawing/2014/main" id="{4030C9F7-ABD7-16E9-D1E8-72B09B9E1D0C}"/>
-              </a:ext>
-            </a:extLst>
-          </p:cNvPr>
-          <p:cNvSpPr/>
-          <p:nvPr/>
-        </p:nvSpPr>
-        <p:spPr>
-          <a:xfrm>
-            <a:off x="6885349" y="5885167"/>
-            <a:ext cx="772751" cy="197873"/>
-          </a:xfrm>
-          <a:prstGeom prst="rect">
-            <a:avLst/>
-          </a:prstGeom>
-          <a:noFill/>
-          <a:ln w="38100">
-            <a:solidFill>
-              <a:schemeClr val="accent6">
-                <a:lumMod val="50000"/>
-              </a:schemeClr>
-            </a:solidFill>
-          </a:ln>
-        </p:spPr>
-        <p:style>
-          <a:lnRef idx="2">
-            <a:schemeClr val="accent1">
-              <a:shade val="15000"/>
-            </a:schemeClr>
-          </a:lnRef>
-          <a:fillRef idx="1">
-            <a:schemeClr val="accent1"/>
-          </a:fillRef>
-          <a:effectRef idx="0">
-            <a:schemeClr val="accent1"/>
-          </a:effectRef>
-          <a:fontRef idx="minor">
-            <a:schemeClr val="lt1"/>
-          </a:fontRef>
-        </p:style>
-        <p:txBody>
-          <a:bodyPr rtlCol="0" anchor="ctr"/>
-          <a:lstStyle/>
-          <a:p>
-            <a:pPr algn="ctr"/>
-            <a:endParaRPr lang="pt-BR"/>
-          </a:p>
-        </p:txBody>
-      </p:sp>
-    </p:spTree>
-    <p:extLst>
-      <p:ext uri="{BB962C8B-B14F-4D97-AF65-F5344CB8AC3E}">
-        <p14:creationId xmlns:p14="http://schemas.microsoft.com/office/powerpoint/2010/main" val="594817031"/>
-      </p:ext>
-    </p:extLst>
-  </p:cSld>
-  <p:clrMapOvr>
-    <a:masterClrMapping/>
-  </p:clrMapOvr>
-  <p:timing>
-    <p:tnLst>
-      <p:par>
-        <p:cTn id="1" dur="indefinite" restart="never" nodeType="tmRoot">
-          <p:childTnLst>
-            <p:seq concurrent="1" nextAc="seek">
-              <p:cTn id="2" dur="indefinite" nodeType="mainSeq">
-                <p:childTnLst>
-                  <p:par>
-                    <p:cTn id="3" fill="hold">
-                      <p:stCondLst>
-                        <p:cond delay="indefinite"/>
-                      </p:stCondLst>
-                      <p:childTnLst>
-                        <p:par>
-                          <p:cTn id="4" fill="hold">
-                            <p:stCondLst>
-                              <p:cond delay="0"/>
-                            </p:stCondLst>
-                            <p:childTnLst>
-                              <p:par>
-                                <p:cTn id="5" presetID="2" presetClass="entr" presetSubtype="4" fill="hold" nodeType="clickEffect">
-                                  <p:stCondLst>
-                                    <p:cond delay="0"/>
-                                  </p:stCondLst>
-                                  <p:childTnLst>
-                                    <p:set>
-                                      <p:cBhvr>
-                                        <p:cTn id="6" dur="1" fill="hold">
-                                          <p:stCondLst>
-                                            <p:cond delay="0"/>
-                                          </p:stCondLst>
-                                        </p:cTn>
-                                        <p:tgtEl>
-                                          <p:spTgt spid="4"/>
-                                        </p:tgtEl>
-                                        <p:attrNameLst>
-                                          <p:attrName>style.visibility</p:attrName>
-                                        </p:attrNameLst>
-                                      </p:cBhvr>
-                                      <p:to>
-                                        <p:strVal val="visible"/>
-                                      </p:to>
-                                    </p:set>
-                                    <p:anim calcmode="lin" valueType="num">
-                                      <p:cBhvr additive="base">
-                                        <p:cTn id="7" dur="500" fill="hold"/>
-                                        <p:tgtEl>
-                                          <p:spTgt spid="4"/>
-                                        </p:tgtEl>
-                                        <p:attrNameLst>
-                                          <p:attrName>ppt_x</p:attrName>
-                                        </p:attrNameLst>
-                                      </p:cBhvr>
-                                      <p:tavLst>
-                                        <p:tav tm="0">
-                                          <p:val>
-                                            <p:strVal val="#ppt_x"/>
-                                          </p:val>
-                                        </p:tav>
-                                        <p:tav tm="100000">
-                                          <p:val>
-                                            <p:strVal val="#ppt_x"/>
-                                          </p:val>
-                                        </p:tav>
-                                      </p:tavLst>
-                                    </p:anim>
-                                    <p:anim calcmode="lin" valueType="num">
-                                      <p:cBhvr additive="base">
-                                        <p:cTn id="8" dur="500" fill="hold"/>
-                                        <p:tgtEl>
-                                          <p:spTgt spid="4"/>
-                                        </p:tgtEl>
-                                        <p:attrNameLst>
-                                          <p:attrName>ppt_y</p:attrName>
-                                        </p:attrNameLst>
-                                      </p:cBhvr>
-                                      <p:tavLst>
-                                        <p:tav tm="0">
-                                          <p:val>
-                                            <p:strVal val="1+#ppt_h/2"/>
-                                          </p:val>
-                                        </p:tav>
-                                        <p:tav tm="100000">
-                                          <p:val>
-                                            <p:strVal val="#ppt_y"/>
-                                          </p:val>
-                                        </p:tav>
-                                      </p:tavLst>
-                                    </p:anim>
-                                  </p:childTnLst>
-                                </p:cTn>
-                              </p:par>
-                            </p:childTnLst>
-                          </p:cTn>
-                        </p:par>
-                      </p:childTnLst>
-                    </p:cTn>
-                  </p:par>
-                </p:childTnLst>
-              </p:cTn>
-              <p:prevCondLst>
-                <p:cond evt="onPrev" delay="0">
-                  <p:tgtEl>
-                    <p:sldTgt/>
-                  </p:tgtEl>
-                </p:cond>
-              </p:prevCondLst>
-              <p:nextCondLst>
-                <p:cond evt="onNext" delay="0">
-                  <p:tgtEl>
-                    <p:sldTgt/>
-                  </p:tgtEl>
-                </p:cond>
-              </p:nextCondLst>
-            </p:seq>
-          </p:childTnLst>
-        </p:cTn>
-      </p:par>
-    </p:tnLst>
-  </p:timing>
-</p:sld>
-</file>
-
-<file path=ppt/slides/slide5.xml><?xml version="1.0" encoding="utf-8"?>
 <p:sld xmlns:a="http://schemas.openxmlformats.org/drawingml/2006/main" xmlns:r="http://schemas.openxmlformats.org/officeDocument/2006/relationships" xmlns:p="http://schemas.openxmlformats.org/presentationml/2006/main">
   <p:cSld>
     <p:spTree>

</xml_diff>

<commit_message>
Querys de relatórios de detalhes e de exportação
</commit_message>
<xml_diff>
--- a/log.pptx
+++ b/log.pptx
@@ -262,7 +262,7 @@
           <a:p>
             <a:fld id="{66C6D18E-06BD-430D-8E88-D467113632A0}" type="datetimeFigureOut">
               <a:rPr lang="pt-BR" smtClean="0"/>
-              <a:t>12/04/2024</a:t>
+              <a:t>18/04/2024</a:t>
             </a:fld>
             <a:endParaRPr lang="pt-BR"/>
           </a:p>
@@ -460,7 +460,7 @@
           <a:p>
             <a:fld id="{66C6D18E-06BD-430D-8E88-D467113632A0}" type="datetimeFigureOut">
               <a:rPr lang="pt-BR" smtClean="0"/>
-              <a:t>12/04/2024</a:t>
+              <a:t>18/04/2024</a:t>
             </a:fld>
             <a:endParaRPr lang="pt-BR"/>
           </a:p>
@@ -668,7 +668,7 @@
           <a:p>
             <a:fld id="{66C6D18E-06BD-430D-8E88-D467113632A0}" type="datetimeFigureOut">
               <a:rPr lang="pt-BR" smtClean="0"/>
-              <a:t>12/04/2024</a:t>
+              <a:t>18/04/2024</a:t>
             </a:fld>
             <a:endParaRPr lang="pt-BR"/>
           </a:p>
@@ -866,7 +866,7 @@
           <a:p>
             <a:fld id="{66C6D18E-06BD-430D-8E88-D467113632A0}" type="datetimeFigureOut">
               <a:rPr lang="pt-BR" smtClean="0"/>
-              <a:t>12/04/2024</a:t>
+              <a:t>18/04/2024</a:t>
             </a:fld>
             <a:endParaRPr lang="pt-BR"/>
           </a:p>
@@ -1141,7 +1141,7 @@
           <a:p>
             <a:fld id="{66C6D18E-06BD-430D-8E88-D467113632A0}" type="datetimeFigureOut">
               <a:rPr lang="pt-BR" smtClean="0"/>
-              <a:t>12/04/2024</a:t>
+              <a:t>18/04/2024</a:t>
             </a:fld>
             <a:endParaRPr lang="pt-BR"/>
           </a:p>
@@ -1406,7 +1406,7 @@
           <a:p>
             <a:fld id="{66C6D18E-06BD-430D-8E88-D467113632A0}" type="datetimeFigureOut">
               <a:rPr lang="pt-BR" smtClean="0"/>
-              <a:t>12/04/2024</a:t>
+              <a:t>18/04/2024</a:t>
             </a:fld>
             <a:endParaRPr lang="pt-BR"/>
           </a:p>
@@ -1818,7 +1818,7 @@
           <a:p>
             <a:fld id="{66C6D18E-06BD-430D-8E88-D467113632A0}" type="datetimeFigureOut">
               <a:rPr lang="pt-BR" smtClean="0"/>
-              <a:t>12/04/2024</a:t>
+              <a:t>18/04/2024</a:t>
             </a:fld>
             <a:endParaRPr lang="pt-BR"/>
           </a:p>
@@ -1959,7 +1959,7 @@
           <a:p>
             <a:fld id="{66C6D18E-06BD-430D-8E88-D467113632A0}" type="datetimeFigureOut">
               <a:rPr lang="pt-BR" smtClean="0"/>
-              <a:t>12/04/2024</a:t>
+              <a:t>18/04/2024</a:t>
             </a:fld>
             <a:endParaRPr lang="pt-BR"/>
           </a:p>
@@ -2072,7 +2072,7 @@
           <a:p>
             <a:fld id="{66C6D18E-06BD-430D-8E88-D467113632A0}" type="datetimeFigureOut">
               <a:rPr lang="pt-BR" smtClean="0"/>
-              <a:t>12/04/2024</a:t>
+              <a:t>18/04/2024</a:t>
             </a:fld>
             <a:endParaRPr lang="pt-BR"/>
           </a:p>
@@ -2383,7 +2383,7 @@
           <a:p>
             <a:fld id="{66C6D18E-06BD-430D-8E88-D467113632A0}" type="datetimeFigureOut">
               <a:rPr lang="pt-BR" smtClean="0"/>
-              <a:t>12/04/2024</a:t>
+              <a:t>18/04/2024</a:t>
             </a:fld>
             <a:endParaRPr lang="pt-BR"/>
           </a:p>
@@ -2671,7 +2671,7 @@
           <a:p>
             <a:fld id="{66C6D18E-06BD-430D-8E88-D467113632A0}" type="datetimeFigureOut">
               <a:rPr lang="pt-BR" smtClean="0"/>
-              <a:t>12/04/2024</a:t>
+              <a:t>18/04/2024</a:t>
             </a:fld>
             <a:endParaRPr lang="pt-BR"/>
           </a:p>
@@ -2912,7 +2912,7 @@
           <a:p>
             <a:fld id="{66C6D18E-06BD-430D-8E88-D467113632A0}" type="datetimeFigureOut">
               <a:rPr lang="pt-BR" smtClean="0"/>
-              <a:t>12/04/2024</a:t>
+              <a:t>18/04/2024</a:t>
             </a:fld>
             <a:endParaRPr lang="pt-BR"/>
           </a:p>
@@ -4428,10 +4428,10 @@
       </p:pic>
       <p:pic>
         <p:nvPicPr>
-          <p:cNvPr id="7" name="Imagem 6">
-            <a:extLst>
-              <a:ext uri="{FF2B5EF4-FFF2-40B4-BE49-F238E27FC236}">
-                <a16:creationId xmlns:a16="http://schemas.microsoft.com/office/drawing/2014/main" id="{E50F27A4-9AFC-F4E3-8DAF-E8C7D0A51CE3}"/>
+          <p:cNvPr id="3" name="Imagem 2" descr="Logotipo, nome da empresa&#10;&#10;Descrição gerada automaticamente">
+            <a:extLst>
+              <a:ext uri="{FF2B5EF4-FFF2-40B4-BE49-F238E27FC236}">
+                <a16:creationId xmlns:a16="http://schemas.microsoft.com/office/drawing/2014/main" id="{9219A091-E0B1-F2E6-6576-3774CF1F89C6}"/>
               </a:ext>
             </a:extLst>
           </p:cNvPr>
@@ -4441,27 +4441,111 @@
           <p:nvPr/>
         </p:nvPicPr>
         <p:blipFill>
-          <a:blip r:embed="rId3"/>
+          <a:blip r:embed="rId3" cstate="print">
+            <a:extLst>
+              <a:ext uri="{28A0092B-C50C-407E-A947-70E740481C1C}">
+                <a14:useLocalDpi xmlns:a14="http://schemas.microsoft.com/office/drawing/2010/main" val="0"/>
+              </a:ext>
+            </a:extLst>
+          </a:blip>
           <a:stretch>
             <a:fillRect/>
           </a:stretch>
         </p:blipFill>
         <p:spPr>
           <a:xfrm>
-            <a:off x="747660" y="977566"/>
-            <a:ext cx="10256823" cy="5206064"/>
+            <a:off x="10232571" y="6056502"/>
+            <a:ext cx="1730829" cy="803653"/>
           </a:xfrm>
           <a:prstGeom prst="rect">
             <a:avLst/>
           </a:prstGeom>
         </p:spPr>
       </p:pic>
+      <p:sp>
+        <p:nvSpPr>
+          <p:cNvPr id="2" name="Subtítulo 2">
+            <a:extLst>
+              <a:ext uri="{FF2B5EF4-FFF2-40B4-BE49-F238E27FC236}">
+                <a16:creationId xmlns:a16="http://schemas.microsoft.com/office/drawing/2014/main" id="{EC625675-72F7-A912-8106-0A7A83555282}"/>
+              </a:ext>
+            </a:extLst>
+          </p:cNvPr>
+          <p:cNvSpPr>
+            <a:spLocks noGrp="1"/>
+          </p:cNvSpPr>
+          <p:nvPr>
+            <p:ph type="subTitle" idx="1"/>
+          </p:nvPr>
+        </p:nvSpPr>
+        <p:spPr>
+          <a:xfrm>
+            <a:off x="0" y="0"/>
+            <a:ext cx="2804932" cy="1655762"/>
+          </a:xfrm>
+        </p:spPr>
+        <p:txBody>
+          <a:bodyPr>
+            <a:normAutofit/>
+          </a:bodyPr>
+          <a:lstStyle/>
+          <a:p>
+            <a:r>
+              <a:rPr lang="pt-BR" sz="4000" dirty="0"/>
+              <a:t>IW</a:t>
+            </a:r>
+          </a:p>
+        </p:txBody>
+      </p:sp>
+      <p:sp>
+        <p:nvSpPr>
+          <p:cNvPr id="5" name="CaixaDeTexto 4">
+            <a:extLst>
+              <a:ext uri="{FF2B5EF4-FFF2-40B4-BE49-F238E27FC236}">
+                <a16:creationId xmlns:a16="http://schemas.microsoft.com/office/drawing/2014/main" id="{4AE81DB5-FA37-6E89-EDF5-43EC839FD5BC}"/>
+              </a:ext>
+            </a:extLst>
+          </p:cNvPr>
+          <p:cNvSpPr txBox="1"/>
+          <p:nvPr/>
+        </p:nvSpPr>
+        <p:spPr>
+          <a:xfrm>
+            <a:off x="2784067" y="76421"/>
+            <a:ext cx="6689652" cy="369332"/>
+          </a:xfrm>
+          <a:prstGeom prst="rect">
+            <a:avLst/>
+          </a:prstGeom>
+          <a:noFill/>
+        </p:spPr>
+        <p:txBody>
+          <a:bodyPr wrap="none" rtlCol="0">
+            <a:spAutoFit/>
+          </a:bodyPr>
+          <a:lstStyle/>
+          <a:p>
+            <a:r>
+              <a:rPr lang="pt-BR" dirty="0"/>
+              <a:t>Extração de “</a:t>
+            </a:r>
+            <a:r>
+              <a:rPr lang="pt-BR" dirty="0" err="1"/>
+              <a:t>Fech</a:t>
+            </a:r>
+            <a:r>
+              <a:rPr lang="pt-BR" dirty="0"/>
+              <a:t>. Estoque – Informações Complementares” em CSV:</a:t>
+            </a:r>
+          </a:p>
+        </p:txBody>
+      </p:sp>
       <p:pic>
         <p:nvPicPr>
-          <p:cNvPr id="3" name="Imagem 2" descr="Logotipo, nome da empresa&#10;&#10;Descrição gerada automaticamente">
-            <a:extLst>
-              <a:ext uri="{FF2B5EF4-FFF2-40B4-BE49-F238E27FC236}">
-                <a16:creationId xmlns:a16="http://schemas.microsoft.com/office/drawing/2014/main" id="{9219A091-E0B1-F2E6-6576-3774CF1F89C6}"/>
+          <p:cNvPr id="8" name="Imagem 7">
+            <a:extLst>
+              <a:ext uri="{FF2B5EF4-FFF2-40B4-BE49-F238E27FC236}">
+                <a16:creationId xmlns:a16="http://schemas.microsoft.com/office/drawing/2014/main" id="{423D4C3A-1899-A913-36ED-2B2B3D43B2D0}"/>
               </a:ext>
             </a:extLst>
           </p:cNvPr>
@@ -4471,21 +4555,15 @@
           <p:nvPr/>
         </p:nvPicPr>
         <p:blipFill>
-          <a:blip r:embed="rId4" cstate="print">
-            <a:extLst>
-              <a:ext uri="{28A0092B-C50C-407E-A947-70E740481C1C}">
-                <a14:useLocalDpi xmlns:a14="http://schemas.microsoft.com/office/drawing/2010/main" val="0"/>
-              </a:ext>
-            </a:extLst>
-          </a:blip>
+          <a:blip r:embed="rId4"/>
           <a:stretch>
             <a:fillRect/>
           </a:stretch>
         </p:blipFill>
         <p:spPr>
           <a:xfrm>
-            <a:off x="10232571" y="6056502"/>
-            <a:ext cx="1730829" cy="803653"/>
+            <a:off x="904509" y="626324"/>
+            <a:ext cx="8691929" cy="5832004"/>
           </a:xfrm>
           <a:prstGeom prst="rect">
             <a:avLst/>
@@ -4494,84 +4572,6 @@
       </p:pic>
       <p:sp>
         <p:nvSpPr>
-          <p:cNvPr id="2" name="Subtítulo 2">
-            <a:extLst>
-              <a:ext uri="{FF2B5EF4-FFF2-40B4-BE49-F238E27FC236}">
-                <a16:creationId xmlns:a16="http://schemas.microsoft.com/office/drawing/2014/main" id="{EC625675-72F7-A912-8106-0A7A83555282}"/>
-              </a:ext>
-            </a:extLst>
-          </p:cNvPr>
-          <p:cNvSpPr>
-            <a:spLocks noGrp="1"/>
-          </p:cNvSpPr>
-          <p:nvPr>
-            <p:ph type="subTitle" idx="1"/>
-          </p:nvPr>
-        </p:nvSpPr>
-        <p:spPr>
-          <a:xfrm>
-            <a:off x="0" y="0"/>
-            <a:ext cx="2804932" cy="1655762"/>
-          </a:xfrm>
-        </p:spPr>
-        <p:txBody>
-          <a:bodyPr>
-            <a:normAutofit/>
-          </a:bodyPr>
-          <a:lstStyle/>
-          <a:p>
-            <a:r>
-              <a:rPr lang="pt-BR" sz="4000" dirty="0"/>
-              <a:t>IW</a:t>
-            </a:r>
-          </a:p>
-        </p:txBody>
-      </p:sp>
-      <p:sp>
-        <p:nvSpPr>
-          <p:cNvPr id="5" name="CaixaDeTexto 4">
-            <a:extLst>
-              <a:ext uri="{FF2B5EF4-FFF2-40B4-BE49-F238E27FC236}">
-                <a16:creationId xmlns:a16="http://schemas.microsoft.com/office/drawing/2014/main" id="{4AE81DB5-FA37-6E89-EDF5-43EC839FD5BC}"/>
-              </a:ext>
-            </a:extLst>
-          </p:cNvPr>
-          <p:cNvSpPr txBox="1"/>
-          <p:nvPr/>
-        </p:nvSpPr>
-        <p:spPr>
-          <a:xfrm>
-            <a:off x="2784067" y="76421"/>
-            <a:ext cx="6705875" cy="369332"/>
-          </a:xfrm>
-          <a:prstGeom prst="rect">
-            <a:avLst/>
-          </a:prstGeom>
-          <a:noFill/>
-        </p:spPr>
-        <p:txBody>
-          <a:bodyPr wrap="none" rtlCol="0">
-            <a:spAutoFit/>
-          </a:bodyPr>
-          <a:lstStyle/>
-          <a:p>
-            <a:r>
-              <a:rPr lang="pt-BR" dirty="0"/>
-              <a:t>Extração de “</a:t>
-            </a:r>
-            <a:r>
-              <a:rPr lang="pt-BR" dirty="0" err="1"/>
-              <a:t>Fech</a:t>
-            </a:r>
-            <a:r>
-              <a:rPr lang="pt-BR" dirty="0"/>
-              <a:t>. Estoque – Informações Complementares” em PDF:</a:t>
-            </a:r>
-          </a:p>
-        </p:txBody>
-      </p:sp>
-      <p:sp>
-        <p:nvSpPr>
           <p:cNvPr id="9" name="Retângulo 8">
             <a:extLst>
               <a:ext uri="{FF2B5EF4-FFF2-40B4-BE49-F238E27FC236}">
@@ -4584,7 +4584,7 @@
         </p:nvSpPr>
         <p:spPr>
           <a:xfrm>
-            <a:off x="6725008" y="1153881"/>
+            <a:off x="6336388" y="1264761"/>
             <a:ext cx="1942012" cy="269437"/>
           </a:xfrm>
           <a:prstGeom prst="rect">
@@ -4638,7 +4638,7 @@
         </p:nvSpPr>
         <p:spPr>
           <a:xfrm>
-            <a:off x="9387068" y="830717"/>
+            <a:off x="9158468" y="3105834"/>
             <a:ext cx="2804932" cy="646331"/>
           </a:xfrm>
           <a:prstGeom prst="rect">
@@ -4680,15 +4680,13 @@
           </p:cNvPr>
           <p:cNvCxnSpPr>
             <a:cxnSpLocks/>
-            <a:stCxn id="10" idx="2"/>
-            <a:endCxn id="9" idx="0"/>
           </p:cNvCxnSpPr>
           <p:nvPr/>
         </p:nvCxnSpPr>
         <p:spPr>
           <a:xfrm flipH="1" flipV="1">
-            <a:off x="7696014" y="1153881"/>
-            <a:ext cx="3093520" cy="323167"/>
+            <a:off x="7307394" y="1534198"/>
+            <a:ext cx="3253540" cy="1571636"/>
           </a:xfrm>
           <a:prstGeom prst="straightConnector1">
             <a:avLst/>

</xml_diff>